<commit_message>
Some Current Overpotential Accuracy
</commit_message>
<xml_diff>
--- a/ChemPhysicsMisc/MiscScienceScripts/CuPourbaixannotated.pptx
+++ b/ChemPhysicsMisc/MiscScienceScripts/CuPourbaixannotated.pptx
@@ -7,6 +7,7 @@
   <p:sldIdLst>
     <p:sldId id="256" r:id="rId2"/>
     <p:sldId id="257" r:id="rId3"/>
+    <p:sldId id="259" r:id="rId4"/>
   </p:sldIdLst>
   <p:sldSz cx="12192000" cy="6858000"/>
   <p:notesSz cx="6858000" cy="9144000"/>
@@ -262,7 +263,7 @@
           <a:p>
             <a:fld id="{22C4EE2D-CA8C-DA4F-A22D-50BF5AF47C96}" type="datetimeFigureOut">
               <a:rPr lang="en-CA" smtClean="0"/>
-              <a:t>2022-02-15</a:t>
+              <a:t>2022-02-19</a:t>
             </a:fld>
             <a:endParaRPr lang="en-CA"/>
           </a:p>
@@ -462,7 +463,7 @@
           <a:p>
             <a:fld id="{22C4EE2D-CA8C-DA4F-A22D-50BF5AF47C96}" type="datetimeFigureOut">
               <a:rPr lang="en-CA" smtClean="0"/>
-              <a:t>2022-02-15</a:t>
+              <a:t>2022-02-19</a:t>
             </a:fld>
             <a:endParaRPr lang="en-CA"/>
           </a:p>
@@ -672,7 +673,7 @@
           <a:p>
             <a:fld id="{22C4EE2D-CA8C-DA4F-A22D-50BF5AF47C96}" type="datetimeFigureOut">
               <a:rPr lang="en-CA" smtClean="0"/>
-              <a:t>2022-02-15</a:t>
+              <a:t>2022-02-19</a:t>
             </a:fld>
             <a:endParaRPr lang="en-CA"/>
           </a:p>
@@ -872,7 +873,7 @@
           <a:p>
             <a:fld id="{22C4EE2D-CA8C-DA4F-A22D-50BF5AF47C96}" type="datetimeFigureOut">
               <a:rPr lang="en-CA" smtClean="0"/>
-              <a:t>2022-02-15</a:t>
+              <a:t>2022-02-19</a:t>
             </a:fld>
             <a:endParaRPr lang="en-CA"/>
           </a:p>
@@ -1148,7 +1149,7 @@
           <a:p>
             <a:fld id="{22C4EE2D-CA8C-DA4F-A22D-50BF5AF47C96}" type="datetimeFigureOut">
               <a:rPr lang="en-CA" smtClean="0"/>
-              <a:t>2022-02-15</a:t>
+              <a:t>2022-02-19</a:t>
             </a:fld>
             <a:endParaRPr lang="en-CA"/>
           </a:p>
@@ -1416,7 +1417,7 @@
           <a:p>
             <a:fld id="{22C4EE2D-CA8C-DA4F-A22D-50BF5AF47C96}" type="datetimeFigureOut">
               <a:rPr lang="en-CA" smtClean="0"/>
-              <a:t>2022-02-15</a:t>
+              <a:t>2022-02-19</a:t>
             </a:fld>
             <a:endParaRPr lang="en-CA"/>
           </a:p>
@@ -1831,7 +1832,7 @@
           <a:p>
             <a:fld id="{22C4EE2D-CA8C-DA4F-A22D-50BF5AF47C96}" type="datetimeFigureOut">
               <a:rPr lang="en-CA" smtClean="0"/>
-              <a:t>2022-02-15</a:t>
+              <a:t>2022-02-19</a:t>
             </a:fld>
             <a:endParaRPr lang="en-CA"/>
           </a:p>
@@ -1973,7 +1974,7 @@
           <a:p>
             <a:fld id="{22C4EE2D-CA8C-DA4F-A22D-50BF5AF47C96}" type="datetimeFigureOut">
               <a:rPr lang="en-CA" smtClean="0"/>
-              <a:t>2022-02-15</a:t>
+              <a:t>2022-02-19</a:t>
             </a:fld>
             <a:endParaRPr lang="en-CA"/>
           </a:p>
@@ -2086,7 +2087,7 @@
           <a:p>
             <a:fld id="{22C4EE2D-CA8C-DA4F-A22D-50BF5AF47C96}" type="datetimeFigureOut">
               <a:rPr lang="en-CA" smtClean="0"/>
-              <a:t>2022-02-15</a:t>
+              <a:t>2022-02-19</a:t>
             </a:fld>
             <a:endParaRPr lang="en-CA"/>
           </a:p>
@@ -2399,7 +2400,7 @@
           <a:p>
             <a:fld id="{22C4EE2D-CA8C-DA4F-A22D-50BF5AF47C96}" type="datetimeFigureOut">
               <a:rPr lang="en-CA" smtClean="0"/>
-              <a:t>2022-02-15</a:t>
+              <a:t>2022-02-19</a:t>
             </a:fld>
             <a:endParaRPr lang="en-CA"/>
           </a:p>
@@ -2688,7 +2689,7 @@
           <a:p>
             <a:fld id="{22C4EE2D-CA8C-DA4F-A22D-50BF5AF47C96}" type="datetimeFigureOut">
               <a:rPr lang="en-CA" smtClean="0"/>
-              <a:t>2022-02-15</a:t>
+              <a:t>2022-02-19</a:t>
             </a:fld>
             <a:endParaRPr lang="en-CA"/>
           </a:p>
@@ -2931,7 +2932,7 @@
           <a:p>
             <a:fld id="{22C4EE2D-CA8C-DA4F-A22D-50BF5AF47C96}" type="datetimeFigureOut">
               <a:rPr lang="en-CA" smtClean="0"/>
-              <a:t>2022-02-15</a:t>
+              <a:t>2022-02-19</a:t>
             </a:fld>
             <a:endParaRPr lang="en-CA"/>
           </a:p>
@@ -5255,6 +5256,1656 @@
 </p:sld>
 </file>
 
+<file path=ppt/slides/slide3.xml><?xml version="1.0" encoding="utf-8"?>
+<p:sld xmlns:a="http://schemas.openxmlformats.org/drawingml/2006/main" xmlns:r="http://schemas.openxmlformats.org/officeDocument/2006/relationships" xmlns:p="http://schemas.openxmlformats.org/presentationml/2006/main">
+  <p:cSld>
+    <p:spTree>
+      <p:nvGrpSpPr>
+        <p:cNvPr id="1" name=""/>
+        <p:cNvGrpSpPr/>
+        <p:nvPr/>
+      </p:nvGrpSpPr>
+      <p:grpSpPr>
+        <a:xfrm>
+          <a:off x="0" y="0"/>
+          <a:ext cx="0" cy="0"/>
+          <a:chOff x="0" y="0"/>
+          <a:chExt cx="0" cy="0"/>
+        </a:xfrm>
+      </p:grpSpPr>
+      <p:cxnSp>
+        <p:nvCxnSpPr>
+          <p:cNvPr id="5" name="Straight Connector 4">
+            <a:extLst>
+              <a:ext uri="{FF2B5EF4-FFF2-40B4-BE49-F238E27FC236}">
+                <a16:creationId xmlns:a16="http://schemas.microsoft.com/office/drawing/2014/main" id="{2118A3A3-E6D1-FD41-A956-1CB52704D061}"/>
+              </a:ext>
+            </a:extLst>
+          </p:cNvPr>
+          <p:cNvCxnSpPr>
+            <a:cxnSpLocks/>
+          </p:cNvCxnSpPr>
+          <p:nvPr/>
+        </p:nvCxnSpPr>
+        <p:spPr>
+          <a:xfrm>
+            <a:off x="4114800" y="1023257"/>
+            <a:ext cx="0" cy="5257800"/>
+          </a:xfrm>
+          <a:prstGeom prst="line">
+            <a:avLst/>
+          </a:prstGeom>
+          <a:ln w="28575"/>
+        </p:spPr>
+        <p:style>
+          <a:lnRef idx="1">
+            <a:schemeClr val="dk1"/>
+          </a:lnRef>
+          <a:fillRef idx="0">
+            <a:schemeClr val="dk1"/>
+          </a:fillRef>
+          <a:effectRef idx="0">
+            <a:schemeClr val="dk1"/>
+          </a:effectRef>
+          <a:fontRef idx="minor">
+            <a:schemeClr val="tx1"/>
+          </a:fontRef>
+        </p:style>
+      </p:cxnSp>
+      <p:cxnSp>
+        <p:nvCxnSpPr>
+          <p:cNvPr id="7" name="Straight Connector 6">
+            <a:extLst>
+              <a:ext uri="{FF2B5EF4-FFF2-40B4-BE49-F238E27FC236}">
+                <a16:creationId xmlns:a16="http://schemas.microsoft.com/office/drawing/2014/main" id="{CF6C22FF-72CB-D64F-99C2-F02BD1C4672D}"/>
+              </a:ext>
+            </a:extLst>
+          </p:cNvPr>
+          <p:cNvCxnSpPr>
+            <a:cxnSpLocks/>
+          </p:cNvCxnSpPr>
+          <p:nvPr/>
+        </p:nvCxnSpPr>
+        <p:spPr>
+          <a:xfrm>
+            <a:off x="6912429" y="1023257"/>
+            <a:ext cx="0" cy="5257800"/>
+          </a:xfrm>
+          <a:prstGeom prst="line">
+            <a:avLst/>
+          </a:prstGeom>
+          <a:ln w="28575"/>
+        </p:spPr>
+        <p:style>
+          <a:lnRef idx="1">
+            <a:schemeClr val="dk1"/>
+          </a:lnRef>
+          <a:fillRef idx="0">
+            <a:schemeClr val="dk1"/>
+          </a:fillRef>
+          <a:effectRef idx="0">
+            <a:schemeClr val="dk1"/>
+          </a:effectRef>
+          <a:fontRef idx="minor">
+            <a:schemeClr val="tx1"/>
+          </a:fontRef>
+        </p:style>
+      </p:cxnSp>
+      <p:sp>
+        <p:nvSpPr>
+          <p:cNvPr id="8" name="TextBox 7">
+            <a:extLst>
+              <a:ext uri="{FF2B5EF4-FFF2-40B4-BE49-F238E27FC236}">
+                <a16:creationId xmlns:a16="http://schemas.microsoft.com/office/drawing/2014/main" id="{84D83E5D-2E99-C148-968A-B5D81EE90985}"/>
+              </a:ext>
+            </a:extLst>
+          </p:cNvPr>
+          <p:cNvSpPr txBox="1"/>
+          <p:nvPr/>
+        </p:nvSpPr>
+        <p:spPr>
+          <a:xfrm>
+            <a:off x="3570515" y="561592"/>
+            <a:ext cx="1328053" cy="461665"/>
+          </a:xfrm>
+          <a:prstGeom prst="rect">
+            <a:avLst/>
+          </a:prstGeom>
+          <a:noFill/>
+        </p:spPr>
+        <p:txBody>
+          <a:bodyPr wrap="square" rtlCol="0">
+            <a:spAutoFit/>
+          </a:bodyPr>
+          <a:lstStyle/>
+          <a:p>
+            <a:r>
+              <a:rPr lang="en-CA" sz="2400" dirty="0">
+                <a:latin typeface="Songti TC" panose="02010600040101010101" pitchFamily="2" charset="-120"/>
+                <a:ea typeface="Songti TC" panose="02010600040101010101" pitchFamily="2" charset="-120"/>
+              </a:rPr>
+              <a:t>Cathode</a:t>
+            </a:r>
+          </a:p>
+        </p:txBody>
+      </p:sp>
+      <p:sp>
+        <p:nvSpPr>
+          <p:cNvPr id="9" name="TextBox 8">
+            <a:extLst>
+              <a:ext uri="{FF2B5EF4-FFF2-40B4-BE49-F238E27FC236}">
+                <a16:creationId xmlns:a16="http://schemas.microsoft.com/office/drawing/2014/main" id="{7A4B873E-A260-8B41-9C3E-137CBB9C8D9C}"/>
+              </a:ext>
+            </a:extLst>
+          </p:cNvPr>
+          <p:cNvSpPr txBox="1"/>
+          <p:nvPr/>
+        </p:nvSpPr>
+        <p:spPr>
+          <a:xfrm>
+            <a:off x="6498776" y="561591"/>
+            <a:ext cx="1328053" cy="461665"/>
+          </a:xfrm>
+          <a:prstGeom prst="rect">
+            <a:avLst/>
+          </a:prstGeom>
+          <a:noFill/>
+        </p:spPr>
+        <p:txBody>
+          <a:bodyPr wrap="square" rtlCol="0">
+            <a:spAutoFit/>
+          </a:bodyPr>
+          <a:lstStyle/>
+          <a:p>
+            <a:r>
+              <a:rPr lang="en-CA" sz="2400" dirty="0">
+                <a:latin typeface="Songti TC" panose="02010600040101010101" pitchFamily="2" charset="-120"/>
+                <a:ea typeface="Songti TC" panose="02010600040101010101" pitchFamily="2" charset="-120"/>
+              </a:rPr>
+              <a:t>Anode</a:t>
+            </a:r>
+          </a:p>
+        </p:txBody>
+      </p:sp>
+      <p:sp>
+        <p:nvSpPr>
+          <p:cNvPr id="10" name="TextBox 9">
+            <a:extLst>
+              <a:ext uri="{FF2B5EF4-FFF2-40B4-BE49-F238E27FC236}">
+                <a16:creationId xmlns:a16="http://schemas.microsoft.com/office/drawing/2014/main" id="{7CDD7648-B977-1B42-8EFA-F4A7BD8B5FF6}"/>
+              </a:ext>
+            </a:extLst>
+          </p:cNvPr>
+          <p:cNvSpPr txBox="1"/>
+          <p:nvPr/>
+        </p:nvSpPr>
+        <p:spPr>
+          <a:xfrm>
+            <a:off x="7124700" y="948580"/>
+            <a:ext cx="2318657" cy="707886"/>
+          </a:xfrm>
+          <a:prstGeom prst="rect">
+            <a:avLst/>
+          </a:prstGeom>
+          <a:noFill/>
+        </p:spPr>
+        <p:txBody>
+          <a:bodyPr wrap="square" rtlCol="0">
+            <a:spAutoFit/>
+          </a:bodyPr>
+          <a:lstStyle/>
+          <a:p>
+            <a:r>
+              <a:rPr lang="en-CA" sz="4000" dirty="0">
+                <a:latin typeface="Songti TC" panose="02010600040101010101" pitchFamily="2" charset="-120"/>
+                <a:ea typeface="Songti TC" panose="02010600040101010101" pitchFamily="2" charset="-120"/>
+              </a:rPr>
+              <a:t>-</a:t>
+            </a:r>
+          </a:p>
+        </p:txBody>
+      </p:sp>
+      <p:sp>
+        <p:nvSpPr>
+          <p:cNvPr id="11" name="TextBox 10">
+            <a:extLst>
+              <a:ext uri="{FF2B5EF4-FFF2-40B4-BE49-F238E27FC236}">
+                <a16:creationId xmlns:a16="http://schemas.microsoft.com/office/drawing/2014/main" id="{B49D2FEF-0EFA-9645-939C-034BA12981B2}"/>
+              </a:ext>
+            </a:extLst>
+          </p:cNvPr>
+          <p:cNvSpPr txBox="1"/>
+          <p:nvPr/>
+        </p:nvSpPr>
+        <p:spPr>
+          <a:xfrm>
+            <a:off x="3624939" y="1010136"/>
+            <a:ext cx="321138" cy="584775"/>
+          </a:xfrm>
+          <a:prstGeom prst="rect">
+            <a:avLst/>
+          </a:prstGeom>
+          <a:noFill/>
+        </p:spPr>
+        <p:txBody>
+          <a:bodyPr wrap="square" rtlCol="0">
+            <a:spAutoFit/>
+          </a:bodyPr>
+          <a:lstStyle/>
+          <a:p>
+            <a:r>
+              <a:rPr lang="en-CA" sz="3200" dirty="0">
+                <a:latin typeface="Songti TC" panose="02010600040101010101" pitchFamily="2" charset="-120"/>
+                <a:ea typeface="Songti TC" panose="02010600040101010101" pitchFamily="2" charset="-120"/>
+              </a:rPr>
+              <a:t>+</a:t>
+            </a:r>
+          </a:p>
+        </p:txBody>
+      </p:sp>
+      <p:sp>
+        <p:nvSpPr>
+          <p:cNvPr id="12" name="TextBox 11">
+            <a:extLst>
+              <a:ext uri="{FF2B5EF4-FFF2-40B4-BE49-F238E27FC236}">
+                <a16:creationId xmlns:a16="http://schemas.microsoft.com/office/drawing/2014/main" id="{4EE28009-7E04-FB47-A0C2-E70B9FF89470}"/>
+              </a:ext>
+            </a:extLst>
+          </p:cNvPr>
+          <p:cNvSpPr txBox="1"/>
+          <p:nvPr/>
+        </p:nvSpPr>
+        <p:spPr>
+          <a:xfrm>
+            <a:off x="3380010" y="1683834"/>
+            <a:ext cx="1709061" cy="461665"/>
+          </a:xfrm>
+          <a:prstGeom prst="rect">
+            <a:avLst/>
+          </a:prstGeom>
+          <a:noFill/>
+        </p:spPr>
+        <p:txBody>
+          <a:bodyPr wrap="square" rtlCol="0">
+            <a:spAutoFit/>
+          </a:bodyPr>
+          <a:lstStyle/>
+          <a:p>
+            <a:r>
+              <a:rPr lang="en-CA" sz="2400" dirty="0">
+                <a:latin typeface="Songti TC" panose="02010600040101010101" pitchFamily="2" charset="-120"/>
+                <a:ea typeface="Songti TC" panose="02010600040101010101" pitchFamily="2" charset="-120"/>
+              </a:rPr>
+              <a:t>10e</a:t>
+            </a:r>
+            <a:r>
+              <a:rPr lang="en-CA" sz="2400" baseline="30000" dirty="0">
+                <a:latin typeface="Songti TC" panose="02010600040101010101" pitchFamily="2" charset="-120"/>
+                <a:ea typeface="Songti TC" panose="02010600040101010101" pitchFamily="2" charset="-120"/>
+              </a:rPr>
+              <a:t>-</a:t>
+            </a:r>
+            <a:endParaRPr lang="en-CA" sz="2400" dirty="0">
+              <a:latin typeface="Songti TC" panose="02010600040101010101" pitchFamily="2" charset="-120"/>
+              <a:ea typeface="Songti TC" panose="02010600040101010101" pitchFamily="2" charset="-120"/>
+            </a:endParaRPr>
+          </a:p>
+        </p:txBody>
+      </p:sp>
+      <p:cxnSp>
+        <p:nvCxnSpPr>
+          <p:cNvPr id="14" name="Straight Arrow Connector 13">
+            <a:extLst>
+              <a:ext uri="{FF2B5EF4-FFF2-40B4-BE49-F238E27FC236}">
+                <a16:creationId xmlns:a16="http://schemas.microsoft.com/office/drawing/2014/main" id="{6AD0455D-E955-CB43-8887-C5860B32627B}"/>
+              </a:ext>
+            </a:extLst>
+          </p:cNvPr>
+          <p:cNvCxnSpPr/>
+          <p:nvPr/>
+        </p:nvCxnSpPr>
+        <p:spPr>
+          <a:xfrm>
+            <a:off x="3946077" y="1914666"/>
+            <a:ext cx="859968" cy="0"/>
+          </a:xfrm>
+          <a:prstGeom prst="straightConnector1">
+            <a:avLst/>
+          </a:prstGeom>
+          <a:ln w="28575">
+            <a:tailEnd type="triangle"/>
+          </a:ln>
+        </p:spPr>
+        <p:style>
+          <a:lnRef idx="1">
+            <a:schemeClr val="dk1"/>
+          </a:lnRef>
+          <a:fillRef idx="0">
+            <a:schemeClr val="dk1"/>
+          </a:fillRef>
+          <a:effectRef idx="0">
+            <a:schemeClr val="dk1"/>
+          </a:effectRef>
+          <a:fontRef idx="minor">
+            <a:schemeClr val="tx1"/>
+          </a:fontRef>
+        </p:style>
+      </p:cxnSp>
+      <p:sp>
+        <p:nvSpPr>
+          <p:cNvPr id="15" name="TextBox 14">
+            <a:extLst>
+              <a:ext uri="{FF2B5EF4-FFF2-40B4-BE49-F238E27FC236}">
+                <a16:creationId xmlns:a16="http://schemas.microsoft.com/office/drawing/2014/main" id="{AED67F5F-0E70-D142-B766-D4F74F349A84}"/>
+              </a:ext>
+            </a:extLst>
+          </p:cNvPr>
+          <p:cNvSpPr txBox="1"/>
+          <p:nvPr/>
+        </p:nvSpPr>
+        <p:spPr>
+          <a:xfrm>
+            <a:off x="6052453" y="1683834"/>
+            <a:ext cx="1709061" cy="461665"/>
+          </a:xfrm>
+          <a:prstGeom prst="rect">
+            <a:avLst/>
+          </a:prstGeom>
+          <a:noFill/>
+        </p:spPr>
+        <p:txBody>
+          <a:bodyPr wrap="square" rtlCol="0">
+            <a:spAutoFit/>
+          </a:bodyPr>
+          <a:lstStyle/>
+          <a:p>
+            <a:r>
+              <a:rPr lang="en-CA" sz="2400" dirty="0">
+                <a:latin typeface="Songti TC" panose="02010600040101010101" pitchFamily="2" charset="-120"/>
+                <a:ea typeface="Songti TC" panose="02010600040101010101" pitchFamily="2" charset="-120"/>
+              </a:rPr>
+              <a:t>10e</a:t>
+            </a:r>
+            <a:r>
+              <a:rPr lang="en-CA" sz="2400" baseline="30000" dirty="0">
+                <a:latin typeface="Songti TC" panose="02010600040101010101" pitchFamily="2" charset="-120"/>
+                <a:ea typeface="Songti TC" panose="02010600040101010101" pitchFamily="2" charset="-120"/>
+              </a:rPr>
+              <a:t>-</a:t>
+            </a:r>
+            <a:endParaRPr lang="en-CA" sz="2400" dirty="0">
+              <a:latin typeface="Songti TC" panose="02010600040101010101" pitchFamily="2" charset="-120"/>
+              <a:ea typeface="Songti TC" panose="02010600040101010101" pitchFamily="2" charset="-120"/>
+            </a:endParaRPr>
+          </a:p>
+        </p:txBody>
+      </p:sp>
+      <p:cxnSp>
+        <p:nvCxnSpPr>
+          <p:cNvPr id="16" name="Straight Arrow Connector 15">
+            <a:extLst>
+              <a:ext uri="{FF2B5EF4-FFF2-40B4-BE49-F238E27FC236}">
+                <a16:creationId xmlns:a16="http://schemas.microsoft.com/office/drawing/2014/main" id="{243410D7-CD21-5B42-801C-DAA2B62BF37B}"/>
+              </a:ext>
+            </a:extLst>
+          </p:cNvPr>
+          <p:cNvCxnSpPr/>
+          <p:nvPr/>
+        </p:nvCxnSpPr>
+        <p:spPr>
+          <a:xfrm>
+            <a:off x="6618520" y="1914666"/>
+            <a:ext cx="859968" cy="0"/>
+          </a:xfrm>
+          <a:prstGeom prst="straightConnector1">
+            <a:avLst/>
+          </a:prstGeom>
+          <a:ln w="28575">
+            <a:tailEnd type="triangle"/>
+          </a:ln>
+        </p:spPr>
+        <p:style>
+          <a:lnRef idx="1">
+            <a:schemeClr val="dk1"/>
+          </a:lnRef>
+          <a:fillRef idx="0">
+            <a:schemeClr val="dk1"/>
+          </a:fillRef>
+          <a:effectRef idx="0">
+            <a:schemeClr val="dk1"/>
+          </a:effectRef>
+          <a:fontRef idx="minor">
+            <a:schemeClr val="tx1"/>
+          </a:fontRef>
+        </p:style>
+      </p:cxnSp>
+      <p:sp>
+        <p:nvSpPr>
+          <p:cNvPr id="17" name="TextBox 16">
+            <a:extLst>
+              <a:ext uri="{FF2B5EF4-FFF2-40B4-BE49-F238E27FC236}">
+                <a16:creationId xmlns:a16="http://schemas.microsoft.com/office/drawing/2014/main" id="{01C5ACF2-5DEA-6E40-8309-E0670C7A4C57}"/>
+              </a:ext>
+            </a:extLst>
+          </p:cNvPr>
+          <p:cNvSpPr txBox="1"/>
+          <p:nvPr/>
+        </p:nvSpPr>
+        <p:spPr>
+          <a:xfrm>
+            <a:off x="6958691" y="2344411"/>
+            <a:ext cx="2838449" cy="461665"/>
+          </a:xfrm>
+          <a:prstGeom prst="rect">
+            <a:avLst/>
+          </a:prstGeom>
+          <a:noFill/>
+        </p:spPr>
+        <p:txBody>
+          <a:bodyPr wrap="square" rtlCol="0">
+            <a:spAutoFit/>
+          </a:bodyPr>
+          <a:lstStyle/>
+          <a:p>
+            <a:r>
+              <a:rPr lang="en-US" sz="2400" dirty="0">
+                <a:latin typeface="Songti TC" panose="02010600040101010101" pitchFamily="2" charset="-120"/>
+                <a:ea typeface="Songti TC" panose="02010600040101010101" pitchFamily="2" charset="-120"/>
+              </a:rPr>
+              <a:t>10Fe</a:t>
+            </a:r>
+            <a:r>
+              <a:rPr lang="en-US" sz="2400" baseline="30000" dirty="0">
+                <a:latin typeface="Songti TC" panose="02010600040101010101" pitchFamily="2" charset="-120"/>
+                <a:ea typeface="Songti TC" panose="02010600040101010101" pitchFamily="2" charset="-120"/>
+              </a:rPr>
+              <a:t>2+</a:t>
+            </a:r>
+            <a:r>
+              <a:rPr lang="en-US" sz="2400" dirty="0">
+                <a:latin typeface="Songti TC" panose="02010600040101010101" pitchFamily="2" charset="-120"/>
+                <a:ea typeface="Songti TC" panose="02010600040101010101" pitchFamily="2" charset="-120"/>
+              </a:rPr>
+              <a:t>→10Fe</a:t>
+            </a:r>
+            <a:r>
+              <a:rPr lang="en-US" sz="2400" baseline="30000" dirty="0">
+                <a:latin typeface="Songti TC" panose="02010600040101010101" pitchFamily="2" charset="-120"/>
+                <a:ea typeface="Songti TC" panose="02010600040101010101" pitchFamily="2" charset="-120"/>
+              </a:rPr>
+              <a:t>3+</a:t>
+            </a:r>
+            <a:r>
+              <a:rPr lang="en-US" sz="2400" dirty="0">
+                <a:latin typeface="Songti TC" panose="02010600040101010101" pitchFamily="2" charset="-120"/>
+                <a:ea typeface="Songti TC" panose="02010600040101010101" pitchFamily="2" charset="-120"/>
+              </a:rPr>
+              <a:t>+</a:t>
+            </a:r>
+            <a:r>
+              <a:rPr lang="en-CA" sz="2400" dirty="0">
+                <a:latin typeface="Songti TC" panose="02010600040101010101" pitchFamily="2" charset="-120"/>
+                <a:ea typeface="Songti TC" panose="02010600040101010101" pitchFamily="2" charset="-120"/>
+              </a:rPr>
+              <a:t>10e</a:t>
+            </a:r>
+            <a:r>
+              <a:rPr lang="en-CA" sz="2400" baseline="30000" dirty="0">
+                <a:latin typeface="Songti TC" panose="02010600040101010101" pitchFamily="2" charset="-120"/>
+                <a:ea typeface="Songti TC" panose="02010600040101010101" pitchFamily="2" charset="-120"/>
+              </a:rPr>
+              <a:t>-</a:t>
+            </a:r>
+            <a:endParaRPr lang="en-CA" sz="2400" dirty="0">
+              <a:latin typeface="Songti TC" panose="02010600040101010101" pitchFamily="2" charset="-120"/>
+              <a:ea typeface="Songti TC" panose="02010600040101010101" pitchFamily="2" charset="-120"/>
+            </a:endParaRPr>
+          </a:p>
+        </p:txBody>
+      </p:sp>
+      <p:sp>
+        <p:nvSpPr>
+          <p:cNvPr id="19" name="TextBox 18">
+            <a:extLst>
+              <a:ext uri="{FF2B5EF4-FFF2-40B4-BE49-F238E27FC236}">
+                <a16:creationId xmlns:a16="http://schemas.microsoft.com/office/drawing/2014/main" id="{D9EC2232-609F-D54D-BF56-4C18CBD203FA}"/>
+              </a:ext>
+            </a:extLst>
+          </p:cNvPr>
+          <p:cNvSpPr txBox="1"/>
+          <p:nvPr/>
+        </p:nvSpPr>
+        <p:spPr>
+          <a:xfrm>
+            <a:off x="1186549" y="2398538"/>
+            <a:ext cx="3222174" cy="461665"/>
+          </a:xfrm>
+          <a:prstGeom prst="rect">
+            <a:avLst/>
+          </a:prstGeom>
+          <a:noFill/>
+        </p:spPr>
+        <p:txBody>
+          <a:bodyPr wrap="square" rtlCol="0">
+            <a:spAutoFit/>
+          </a:bodyPr>
+          <a:lstStyle/>
+          <a:p>
+            <a:r>
+              <a:rPr lang="en-US" sz="2400" dirty="0">
+                <a:latin typeface="Songti TC" panose="02010600040101010101" pitchFamily="2" charset="-120"/>
+                <a:ea typeface="Songti TC" panose="02010600040101010101" pitchFamily="2" charset="-120"/>
+              </a:rPr>
+              <a:t>10Fe</a:t>
+            </a:r>
+            <a:r>
+              <a:rPr lang="en-US" sz="2400" baseline="30000" dirty="0">
+                <a:latin typeface="Songti TC" panose="02010600040101010101" pitchFamily="2" charset="-120"/>
+                <a:ea typeface="Songti TC" panose="02010600040101010101" pitchFamily="2" charset="-120"/>
+              </a:rPr>
+              <a:t>3+</a:t>
+            </a:r>
+            <a:r>
+              <a:rPr lang="en-US" sz="2400" dirty="0">
+                <a:latin typeface="Songti TC" panose="02010600040101010101" pitchFamily="2" charset="-120"/>
+                <a:ea typeface="Songti TC" panose="02010600040101010101" pitchFamily="2" charset="-120"/>
+              </a:rPr>
+              <a:t>+</a:t>
+            </a:r>
+            <a:r>
+              <a:rPr lang="en-CA" sz="2400" dirty="0">
+                <a:latin typeface="Songti TC" panose="02010600040101010101" pitchFamily="2" charset="-120"/>
+                <a:ea typeface="Songti TC" panose="02010600040101010101" pitchFamily="2" charset="-120"/>
+              </a:rPr>
+              <a:t>10e</a:t>
+            </a:r>
+            <a:r>
+              <a:rPr lang="en-CA" sz="2400" baseline="30000" dirty="0">
+                <a:latin typeface="Songti TC" panose="02010600040101010101" pitchFamily="2" charset="-120"/>
+                <a:ea typeface="Songti TC" panose="02010600040101010101" pitchFamily="2" charset="-120"/>
+              </a:rPr>
+              <a:t>- </a:t>
+            </a:r>
+            <a:r>
+              <a:rPr lang="en-US" sz="2400" dirty="0">
+                <a:latin typeface="Songti TC" panose="02010600040101010101" pitchFamily="2" charset="-120"/>
+                <a:ea typeface="Songti TC" panose="02010600040101010101" pitchFamily="2" charset="-120"/>
+              </a:rPr>
+              <a:t>→ 10Fe</a:t>
+            </a:r>
+            <a:r>
+              <a:rPr lang="en-US" sz="2400" baseline="30000" dirty="0">
+                <a:latin typeface="Songti TC" panose="02010600040101010101" pitchFamily="2" charset="-120"/>
+                <a:ea typeface="Songti TC" panose="02010600040101010101" pitchFamily="2" charset="-120"/>
+              </a:rPr>
+              <a:t>2+</a:t>
+            </a:r>
+            <a:endParaRPr lang="en-CA" sz="2400" dirty="0">
+              <a:latin typeface="Songti TC" panose="02010600040101010101" pitchFamily="2" charset="-120"/>
+              <a:ea typeface="Songti TC" panose="02010600040101010101" pitchFamily="2" charset="-120"/>
+            </a:endParaRPr>
+          </a:p>
+        </p:txBody>
+      </p:sp>
+      <p:cxnSp>
+        <p:nvCxnSpPr>
+          <p:cNvPr id="20" name="Straight Arrow Connector 19">
+            <a:extLst>
+              <a:ext uri="{FF2B5EF4-FFF2-40B4-BE49-F238E27FC236}">
+                <a16:creationId xmlns:a16="http://schemas.microsoft.com/office/drawing/2014/main" id="{D70B76B2-7BF8-D74B-A665-BBAFA4332059}"/>
+              </a:ext>
+            </a:extLst>
+          </p:cNvPr>
+          <p:cNvCxnSpPr>
+            <a:cxnSpLocks/>
+          </p:cNvCxnSpPr>
+          <p:nvPr/>
+        </p:nvCxnSpPr>
+        <p:spPr>
+          <a:xfrm flipH="1">
+            <a:off x="4114800" y="4919123"/>
+            <a:ext cx="691245" cy="0"/>
+          </a:xfrm>
+          <a:prstGeom prst="straightConnector1">
+            <a:avLst/>
+          </a:prstGeom>
+          <a:ln w="28575">
+            <a:tailEnd type="triangle"/>
+          </a:ln>
+        </p:spPr>
+        <p:style>
+          <a:lnRef idx="1">
+            <a:schemeClr val="dk1"/>
+          </a:lnRef>
+          <a:fillRef idx="0">
+            <a:schemeClr val="dk1"/>
+          </a:fillRef>
+          <a:effectRef idx="0">
+            <a:schemeClr val="dk1"/>
+          </a:effectRef>
+          <a:fontRef idx="minor">
+            <a:schemeClr val="tx1"/>
+          </a:fontRef>
+        </p:style>
+      </p:cxnSp>
+      <p:sp>
+        <p:nvSpPr>
+          <p:cNvPr id="23" name="TextBox 22">
+            <a:extLst>
+              <a:ext uri="{FF2B5EF4-FFF2-40B4-BE49-F238E27FC236}">
+                <a16:creationId xmlns:a16="http://schemas.microsoft.com/office/drawing/2014/main" id="{DE39657F-B231-814F-8724-1A630AD25A8E}"/>
+              </a:ext>
+            </a:extLst>
+          </p:cNvPr>
+          <p:cNvSpPr txBox="1"/>
+          <p:nvPr/>
+        </p:nvSpPr>
+        <p:spPr>
+          <a:xfrm>
+            <a:off x="4103909" y="5047362"/>
+            <a:ext cx="1336217" cy="461665"/>
+          </a:xfrm>
+          <a:prstGeom prst="rect">
+            <a:avLst/>
+          </a:prstGeom>
+          <a:noFill/>
+        </p:spPr>
+        <p:txBody>
+          <a:bodyPr wrap="square" rtlCol="0">
+            <a:spAutoFit/>
+          </a:bodyPr>
+          <a:lstStyle/>
+          <a:p>
+            <a:r>
+              <a:rPr lang="en-US" sz="2400" dirty="0">
+                <a:latin typeface="Songti TC" panose="02010600040101010101" pitchFamily="2" charset="-120"/>
+                <a:ea typeface="Songti TC" panose="02010600040101010101" pitchFamily="2" charset="-120"/>
+              </a:rPr>
+              <a:t>11Fe</a:t>
+            </a:r>
+            <a:r>
+              <a:rPr lang="en-US" sz="2400" baseline="30000" dirty="0">
+                <a:latin typeface="Songti TC" panose="02010600040101010101" pitchFamily="2" charset="-120"/>
+                <a:ea typeface="Songti TC" panose="02010600040101010101" pitchFamily="2" charset="-120"/>
+              </a:rPr>
+              <a:t>2+</a:t>
+            </a:r>
+            <a:endParaRPr lang="en-CA" sz="2400" dirty="0">
+              <a:latin typeface="Songti TC" panose="02010600040101010101" pitchFamily="2" charset="-120"/>
+              <a:ea typeface="Songti TC" panose="02010600040101010101" pitchFamily="2" charset="-120"/>
+            </a:endParaRPr>
+          </a:p>
+        </p:txBody>
+      </p:sp>
+      <p:sp>
+        <p:nvSpPr>
+          <p:cNvPr id="24" name="TextBox 23">
+            <a:extLst>
+              <a:ext uri="{FF2B5EF4-FFF2-40B4-BE49-F238E27FC236}">
+                <a16:creationId xmlns:a16="http://schemas.microsoft.com/office/drawing/2014/main" id="{6CC7CE53-2931-D746-AA5C-66C5FBB04BDC}"/>
+              </a:ext>
+            </a:extLst>
+          </p:cNvPr>
+          <p:cNvSpPr txBox="1"/>
+          <p:nvPr/>
+        </p:nvSpPr>
+        <p:spPr>
+          <a:xfrm>
+            <a:off x="4109350" y="4493251"/>
+            <a:ext cx="985162" cy="461665"/>
+          </a:xfrm>
+          <a:prstGeom prst="rect">
+            <a:avLst/>
+          </a:prstGeom>
+          <a:noFill/>
+        </p:spPr>
+        <p:txBody>
+          <a:bodyPr wrap="square" rtlCol="0">
+            <a:spAutoFit/>
+          </a:bodyPr>
+          <a:lstStyle/>
+          <a:p>
+            <a:r>
+              <a:rPr lang="en-US" sz="2400" dirty="0">
+                <a:latin typeface="Songti TC" panose="02010600040101010101" pitchFamily="2" charset="-120"/>
+                <a:ea typeface="Songti TC" panose="02010600040101010101" pitchFamily="2" charset="-120"/>
+              </a:rPr>
+              <a:t>9Fe</a:t>
+            </a:r>
+            <a:r>
+              <a:rPr lang="en-US" sz="2400" baseline="30000" dirty="0">
+                <a:latin typeface="Songti TC" panose="02010600040101010101" pitchFamily="2" charset="-120"/>
+                <a:ea typeface="Songti TC" panose="02010600040101010101" pitchFamily="2" charset="-120"/>
+              </a:rPr>
+              <a:t>3+</a:t>
+            </a:r>
+            <a:endParaRPr lang="en-CA" sz="2400" dirty="0">
+              <a:latin typeface="Songti TC" panose="02010600040101010101" pitchFamily="2" charset="-120"/>
+              <a:ea typeface="Songti TC" panose="02010600040101010101" pitchFamily="2" charset="-120"/>
+            </a:endParaRPr>
+          </a:p>
+        </p:txBody>
+      </p:sp>
+      <p:cxnSp>
+        <p:nvCxnSpPr>
+          <p:cNvPr id="34" name="Straight Arrow Connector 33">
+            <a:extLst>
+              <a:ext uri="{FF2B5EF4-FFF2-40B4-BE49-F238E27FC236}">
+                <a16:creationId xmlns:a16="http://schemas.microsoft.com/office/drawing/2014/main" id="{BE6F495F-05CB-B643-A201-AB17BAC42629}"/>
+              </a:ext>
+            </a:extLst>
+          </p:cNvPr>
+          <p:cNvCxnSpPr>
+            <a:cxnSpLocks/>
+          </p:cNvCxnSpPr>
+          <p:nvPr/>
+        </p:nvCxnSpPr>
+        <p:spPr>
+          <a:xfrm>
+            <a:off x="4109349" y="4097072"/>
+            <a:ext cx="2797633" cy="0"/>
+          </a:xfrm>
+          <a:prstGeom prst="straightConnector1">
+            <a:avLst/>
+          </a:prstGeom>
+          <a:ln w="28575">
+            <a:tailEnd type="triangle"/>
+          </a:ln>
+        </p:spPr>
+        <p:style>
+          <a:lnRef idx="1">
+            <a:schemeClr val="dk1"/>
+          </a:lnRef>
+          <a:fillRef idx="0">
+            <a:schemeClr val="dk1"/>
+          </a:fillRef>
+          <a:effectRef idx="0">
+            <a:schemeClr val="dk1"/>
+          </a:effectRef>
+          <a:fontRef idx="minor">
+            <a:schemeClr val="tx1"/>
+          </a:fontRef>
+        </p:style>
+      </p:cxnSp>
+      <p:sp>
+        <p:nvSpPr>
+          <p:cNvPr id="37" name="TextBox 36">
+            <a:extLst>
+              <a:ext uri="{FF2B5EF4-FFF2-40B4-BE49-F238E27FC236}">
+                <a16:creationId xmlns:a16="http://schemas.microsoft.com/office/drawing/2014/main" id="{CB4B1F54-B28D-C948-BD15-230534712DA2}"/>
+              </a:ext>
+            </a:extLst>
+          </p:cNvPr>
+          <p:cNvSpPr txBox="1"/>
+          <p:nvPr/>
+        </p:nvSpPr>
+        <p:spPr>
+          <a:xfrm>
+            <a:off x="5016954" y="2533933"/>
+            <a:ext cx="1148439" cy="461665"/>
+          </a:xfrm>
+          <a:prstGeom prst="rect">
+            <a:avLst/>
+          </a:prstGeom>
+          <a:noFill/>
+        </p:spPr>
+        <p:txBody>
+          <a:bodyPr wrap="square" rtlCol="0">
+            <a:spAutoFit/>
+          </a:bodyPr>
+          <a:lstStyle/>
+          <a:p>
+            <a:r>
+              <a:rPr lang="en-US" sz="2400" dirty="0">
+                <a:latin typeface="Songti TC" panose="02010600040101010101" pitchFamily="2" charset="-120"/>
+                <a:ea typeface="Songti TC" panose="02010600040101010101" pitchFamily="2" charset="-120"/>
+              </a:rPr>
+              <a:t>1Fe</a:t>
+            </a:r>
+            <a:r>
+              <a:rPr lang="en-US" sz="2400" baseline="30000" dirty="0">
+                <a:latin typeface="Songti TC" panose="02010600040101010101" pitchFamily="2" charset="-120"/>
+                <a:ea typeface="Songti TC" panose="02010600040101010101" pitchFamily="2" charset="-120"/>
+              </a:rPr>
+              <a:t>2+</a:t>
+            </a:r>
+            <a:endParaRPr lang="en-CA" sz="2400" dirty="0">
+              <a:latin typeface="Songti TC" panose="02010600040101010101" pitchFamily="2" charset="-120"/>
+              <a:ea typeface="Songti TC" panose="02010600040101010101" pitchFamily="2" charset="-120"/>
+            </a:endParaRPr>
+          </a:p>
+        </p:txBody>
+      </p:sp>
+      <p:cxnSp>
+        <p:nvCxnSpPr>
+          <p:cNvPr id="40" name="Straight Arrow Connector 39">
+            <a:extLst>
+              <a:ext uri="{FF2B5EF4-FFF2-40B4-BE49-F238E27FC236}">
+                <a16:creationId xmlns:a16="http://schemas.microsoft.com/office/drawing/2014/main" id="{A25EFA17-5EEE-CF4D-8E2B-4F0D5ABF9F32}"/>
+              </a:ext>
+            </a:extLst>
+          </p:cNvPr>
+          <p:cNvCxnSpPr>
+            <a:cxnSpLocks/>
+          </p:cNvCxnSpPr>
+          <p:nvPr/>
+        </p:nvCxnSpPr>
+        <p:spPr>
+          <a:xfrm flipH="1">
+            <a:off x="4109350" y="3504091"/>
+            <a:ext cx="2797633" cy="0"/>
+          </a:xfrm>
+          <a:prstGeom prst="straightConnector1">
+            <a:avLst/>
+          </a:prstGeom>
+          <a:ln w="28575">
+            <a:tailEnd type="triangle"/>
+          </a:ln>
+        </p:spPr>
+        <p:style>
+          <a:lnRef idx="1">
+            <a:schemeClr val="dk1"/>
+          </a:lnRef>
+          <a:fillRef idx="0">
+            <a:schemeClr val="dk1"/>
+          </a:fillRef>
+          <a:effectRef idx="0">
+            <a:schemeClr val="dk1"/>
+          </a:effectRef>
+          <a:fontRef idx="minor">
+            <a:schemeClr val="tx1"/>
+          </a:fontRef>
+        </p:style>
+      </p:cxnSp>
+      <p:sp>
+        <p:nvSpPr>
+          <p:cNvPr id="42" name="TextBox 41">
+            <a:extLst>
+              <a:ext uri="{FF2B5EF4-FFF2-40B4-BE49-F238E27FC236}">
+                <a16:creationId xmlns:a16="http://schemas.microsoft.com/office/drawing/2014/main" id="{5203BAAF-FD08-6C44-97B1-20C21AC929C4}"/>
+              </a:ext>
+            </a:extLst>
+          </p:cNvPr>
+          <p:cNvSpPr txBox="1"/>
+          <p:nvPr/>
+        </p:nvSpPr>
+        <p:spPr>
+          <a:xfrm>
+            <a:off x="5016954" y="3134658"/>
+            <a:ext cx="1148439" cy="461665"/>
+          </a:xfrm>
+          <a:prstGeom prst="rect">
+            <a:avLst/>
+          </a:prstGeom>
+          <a:noFill/>
+        </p:spPr>
+        <p:txBody>
+          <a:bodyPr wrap="square" rtlCol="0">
+            <a:spAutoFit/>
+          </a:bodyPr>
+          <a:lstStyle/>
+          <a:p>
+            <a:r>
+              <a:rPr lang="en-US" sz="2400" dirty="0">
+                <a:latin typeface="Songti TC" panose="02010600040101010101" pitchFamily="2" charset="-120"/>
+                <a:ea typeface="Songti TC" panose="02010600040101010101" pitchFamily="2" charset="-120"/>
+              </a:rPr>
+              <a:t>1Fe</a:t>
+            </a:r>
+            <a:r>
+              <a:rPr lang="en-US" sz="2400" baseline="30000" dirty="0">
+                <a:latin typeface="Songti TC" panose="02010600040101010101" pitchFamily="2" charset="-120"/>
+                <a:ea typeface="Songti TC" panose="02010600040101010101" pitchFamily="2" charset="-120"/>
+              </a:rPr>
+              <a:t>3+</a:t>
+            </a:r>
+            <a:endParaRPr lang="en-CA" sz="2400" dirty="0">
+              <a:latin typeface="Songti TC" panose="02010600040101010101" pitchFamily="2" charset="-120"/>
+              <a:ea typeface="Songti TC" panose="02010600040101010101" pitchFamily="2" charset="-120"/>
+            </a:endParaRPr>
+          </a:p>
+        </p:txBody>
+      </p:sp>
+      <p:sp>
+        <p:nvSpPr>
+          <p:cNvPr id="43" name="TextBox 42">
+            <a:extLst>
+              <a:ext uri="{FF2B5EF4-FFF2-40B4-BE49-F238E27FC236}">
+                <a16:creationId xmlns:a16="http://schemas.microsoft.com/office/drawing/2014/main" id="{5BC6617D-2696-6D47-9E30-6AB41A0333A7}"/>
+              </a:ext>
+            </a:extLst>
+          </p:cNvPr>
+          <p:cNvSpPr txBox="1"/>
+          <p:nvPr/>
+        </p:nvSpPr>
+        <p:spPr>
+          <a:xfrm>
+            <a:off x="2873826" y="3305231"/>
+            <a:ext cx="1235524" cy="400110"/>
+          </a:xfrm>
+          <a:prstGeom prst="rect">
+            <a:avLst/>
+          </a:prstGeom>
+          <a:noFill/>
+        </p:spPr>
+        <p:txBody>
+          <a:bodyPr wrap="square" rtlCol="0">
+            <a:spAutoFit/>
+          </a:bodyPr>
+          <a:lstStyle/>
+          <a:p>
+            <a:r>
+              <a:rPr lang="en-CA" sz="2000" dirty="0">
+                <a:latin typeface="Songti TC" panose="02010600040101010101" pitchFamily="2" charset="-120"/>
+                <a:ea typeface="Songti TC" panose="02010600040101010101" pitchFamily="2" charset="-120"/>
+              </a:rPr>
+              <a:t>Migration</a:t>
+            </a:r>
+          </a:p>
+        </p:txBody>
+      </p:sp>
+      <p:sp>
+        <p:nvSpPr>
+          <p:cNvPr id="45" name="TextBox 44">
+            <a:extLst>
+              <a:ext uri="{FF2B5EF4-FFF2-40B4-BE49-F238E27FC236}">
+                <a16:creationId xmlns:a16="http://schemas.microsoft.com/office/drawing/2014/main" id="{5B72AD46-AB49-F542-8C32-330C8EBC1967}"/>
+              </a:ext>
+            </a:extLst>
+          </p:cNvPr>
+          <p:cNvSpPr txBox="1"/>
+          <p:nvPr/>
+        </p:nvSpPr>
+        <p:spPr>
+          <a:xfrm>
+            <a:off x="2873826" y="4978695"/>
+            <a:ext cx="1235524" cy="400110"/>
+          </a:xfrm>
+          <a:prstGeom prst="rect">
+            <a:avLst/>
+          </a:prstGeom>
+          <a:noFill/>
+        </p:spPr>
+        <p:txBody>
+          <a:bodyPr wrap="square" rtlCol="0">
+            <a:spAutoFit/>
+          </a:bodyPr>
+          <a:lstStyle/>
+          <a:p>
+            <a:r>
+              <a:rPr lang="en-CA" sz="2000" dirty="0">
+                <a:latin typeface="Songti TC" panose="02010600040101010101" pitchFamily="2" charset="-120"/>
+                <a:ea typeface="Songti TC" panose="02010600040101010101" pitchFamily="2" charset="-120"/>
+              </a:rPr>
+              <a:t>Diffusion</a:t>
+            </a:r>
+          </a:p>
+        </p:txBody>
+      </p:sp>
+      <p:cxnSp>
+        <p:nvCxnSpPr>
+          <p:cNvPr id="28" name="Straight Arrow Connector 27">
+            <a:extLst>
+              <a:ext uri="{FF2B5EF4-FFF2-40B4-BE49-F238E27FC236}">
+                <a16:creationId xmlns:a16="http://schemas.microsoft.com/office/drawing/2014/main" id="{518BFE87-BF65-EC43-A071-FC78EE31BDE1}"/>
+              </a:ext>
+            </a:extLst>
+          </p:cNvPr>
+          <p:cNvCxnSpPr>
+            <a:cxnSpLocks/>
+          </p:cNvCxnSpPr>
+          <p:nvPr/>
+        </p:nvCxnSpPr>
+        <p:spPr>
+          <a:xfrm flipH="1">
+            <a:off x="4109348" y="2941175"/>
+            <a:ext cx="2797633" cy="0"/>
+          </a:xfrm>
+          <a:prstGeom prst="straightConnector1">
+            <a:avLst/>
+          </a:prstGeom>
+          <a:ln w="28575">
+            <a:tailEnd type="triangle"/>
+          </a:ln>
+        </p:spPr>
+        <p:style>
+          <a:lnRef idx="1">
+            <a:schemeClr val="dk1"/>
+          </a:lnRef>
+          <a:fillRef idx="0">
+            <a:schemeClr val="dk1"/>
+          </a:fillRef>
+          <a:effectRef idx="0">
+            <a:schemeClr val="dk1"/>
+          </a:effectRef>
+          <a:fontRef idx="minor">
+            <a:schemeClr val="tx1"/>
+          </a:fontRef>
+        </p:style>
+      </p:cxnSp>
+      <p:sp>
+        <p:nvSpPr>
+          <p:cNvPr id="29" name="TextBox 28">
+            <a:extLst>
+              <a:ext uri="{FF2B5EF4-FFF2-40B4-BE49-F238E27FC236}">
+                <a16:creationId xmlns:a16="http://schemas.microsoft.com/office/drawing/2014/main" id="{E2B88904-DC7C-E248-BF66-C507C1BB9968}"/>
+              </a:ext>
+            </a:extLst>
+          </p:cNvPr>
+          <p:cNvSpPr txBox="1"/>
+          <p:nvPr/>
+        </p:nvSpPr>
+        <p:spPr>
+          <a:xfrm>
+            <a:off x="5016954" y="3669173"/>
+            <a:ext cx="1148439" cy="461665"/>
+          </a:xfrm>
+          <a:prstGeom prst="rect">
+            <a:avLst/>
+          </a:prstGeom>
+          <a:noFill/>
+        </p:spPr>
+        <p:txBody>
+          <a:bodyPr wrap="square" rtlCol="0">
+            <a:spAutoFit/>
+          </a:bodyPr>
+          <a:lstStyle/>
+          <a:p>
+            <a:r>
+              <a:rPr lang="en-US" sz="2400" dirty="0">
+                <a:latin typeface="Songti TC" panose="02010600040101010101" pitchFamily="2" charset="-120"/>
+                <a:ea typeface="Songti TC" panose="02010600040101010101" pitchFamily="2" charset="-120"/>
+              </a:rPr>
+              <a:t>5ClO</a:t>
+            </a:r>
+            <a:r>
+              <a:rPr lang="en-US" sz="2400" baseline="30000" dirty="0">
+                <a:latin typeface="Songti TC" panose="02010600040101010101" pitchFamily="2" charset="-120"/>
+                <a:ea typeface="Songti TC" panose="02010600040101010101" pitchFamily="2" charset="-120"/>
+              </a:rPr>
+              <a:t>-</a:t>
+            </a:r>
+            <a:endParaRPr lang="en-CA" sz="2400" dirty="0">
+              <a:latin typeface="Songti TC" panose="02010600040101010101" pitchFamily="2" charset="-120"/>
+              <a:ea typeface="Songti TC" panose="02010600040101010101" pitchFamily="2" charset="-120"/>
+            </a:endParaRPr>
+          </a:p>
+        </p:txBody>
+      </p:sp>
+      <p:cxnSp>
+        <p:nvCxnSpPr>
+          <p:cNvPr id="30" name="Straight Arrow Connector 29">
+            <a:extLst>
+              <a:ext uri="{FF2B5EF4-FFF2-40B4-BE49-F238E27FC236}">
+                <a16:creationId xmlns:a16="http://schemas.microsoft.com/office/drawing/2014/main" id="{6E3D984C-FDDB-374F-AFDF-0C0879601F9B}"/>
+              </a:ext>
+            </a:extLst>
+          </p:cNvPr>
+          <p:cNvCxnSpPr>
+            <a:cxnSpLocks/>
+          </p:cNvCxnSpPr>
+          <p:nvPr/>
+        </p:nvCxnSpPr>
+        <p:spPr>
+          <a:xfrm flipH="1">
+            <a:off x="4121597" y="4918310"/>
+            <a:ext cx="1000131" cy="813"/>
+          </a:xfrm>
+          <a:prstGeom prst="straightConnector1">
+            <a:avLst/>
+          </a:prstGeom>
+          <a:ln w="28575">
+            <a:tailEnd type="triangle"/>
+          </a:ln>
+        </p:spPr>
+        <p:style>
+          <a:lnRef idx="1">
+            <a:schemeClr val="dk1"/>
+          </a:lnRef>
+          <a:fillRef idx="0">
+            <a:schemeClr val="dk1"/>
+          </a:fillRef>
+          <a:effectRef idx="0">
+            <a:schemeClr val="dk1"/>
+          </a:effectRef>
+          <a:fontRef idx="minor">
+            <a:schemeClr val="tx1"/>
+          </a:fontRef>
+        </p:style>
+      </p:cxnSp>
+      <p:sp>
+        <p:nvSpPr>
+          <p:cNvPr id="35" name="TextBox 34">
+            <a:extLst>
+              <a:ext uri="{FF2B5EF4-FFF2-40B4-BE49-F238E27FC236}">
+                <a16:creationId xmlns:a16="http://schemas.microsoft.com/office/drawing/2014/main" id="{C319F033-639F-2A48-9585-CC80C867E911}"/>
+              </a:ext>
+            </a:extLst>
+          </p:cNvPr>
+          <p:cNvSpPr txBox="1"/>
+          <p:nvPr/>
+        </p:nvSpPr>
+        <p:spPr>
+          <a:xfrm>
+            <a:off x="4103909" y="5667415"/>
+            <a:ext cx="985162" cy="461665"/>
+          </a:xfrm>
+          <a:prstGeom prst="rect">
+            <a:avLst/>
+          </a:prstGeom>
+          <a:noFill/>
+        </p:spPr>
+        <p:txBody>
+          <a:bodyPr wrap="square" rtlCol="0">
+            <a:spAutoFit/>
+          </a:bodyPr>
+          <a:lstStyle/>
+          <a:p>
+            <a:r>
+              <a:rPr lang="en-US" sz="2400" dirty="0">
+                <a:latin typeface="Songti TC" panose="02010600040101010101" pitchFamily="2" charset="-120"/>
+                <a:ea typeface="Songti TC" panose="02010600040101010101" pitchFamily="2" charset="-120"/>
+              </a:rPr>
+              <a:t>5ClO</a:t>
+            </a:r>
+            <a:r>
+              <a:rPr lang="en-US" sz="2400" baseline="30000" dirty="0">
+                <a:latin typeface="Songti TC" panose="02010600040101010101" pitchFamily="2" charset="-120"/>
+                <a:ea typeface="Songti TC" panose="02010600040101010101" pitchFamily="2" charset="-120"/>
+              </a:rPr>
+              <a:t>- </a:t>
+            </a:r>
+            <a:endParaRPr lang="en-CA" sz="2400" dirty="0">
+              <a:latin typeface="Songti TC" panose="02010600040101010101" pitchFamily="2" charset="-120"/>
+              <a:ea typeface="Songti TC" panose="02010600040101010101" pitchFamily="2" charset="-120"/>
+            </a:endParaRPr>
+          </a:p>
+        </p:txBody>
+      </p:sp>
+      <p:cxnSp>
+        <p:nvCxnSpPr>
+          <p:cNvPr id="39" name="Straight Arrow Connector 38">
+            <a:extLst>
+              <a:ext uri="{FF2B5EF4-FFF2-40B4-BE49-F238E27FC236}">
+                <a16:creationId xmlns:a16="http://schemas.microsoft.com/office/drawing/2014/main" id="{D0FE0FBF-2844-F04B-885C-694FFEBFFEFD}"/>
+              </a:ext>
+            </a:extLst>
+          </p:cNvPr>
+          <p:cNvCxnSpPr>
+            <a:cxnSpLocks/>
+          </p:cNvCxnSpPr>
+          <p:nvPr/>
+        </p:nvCxnSpPr>
+        <p:spPr>
+          <a:xfrm>
+            <a:off x="4121597" y="5485797"/>
+            <a:ext cx="1025974" cy="812"/>
+          </a:xfrm>
+          <a:prstGeom prst="straightConnector1">
+            <a:avLst/>
+          </a:prstGeom>
+          <a:ln w="28575">
+            <a:tailEnd type="triangle"/>
+          </a:ln>
+        </p:spPr>
+        <p:style>
+          <a:lnRef idx="1">
+            <a:schemeClr val="dk1"/>
+          </a:lnRef>
+          <a:fillRef idx="0">
+            <a:schemeClr val="dk1"/>
+          </a:fillRef>
+          <a:effectRef idx="0">
+            <a:schemeClr val="dk1"/>
+          </a:effectRef>
+          <a:fontRef idx="minor">
+            <a:schemeClr val="tx1"/>
+          </a:fontRef>
+        </p:style>
+      </p:cxnSp>
+      <p:cxnSp>
+        <p:nvCxnSpPr>
+          <p:cNvPr id="41" name="Straight Arrow Connector 40">
+            <a:extLst>
+              <a:ext uri="{FF2B5EF4-FFF2-40B4-BE49-F238E27FC236}">
+                <a16:creationId xmlns:a16="http://schemas.microsoft.com/office/drawing/2014/main" id="{DBB4AD7A-2FA6-F749-B491-2AFDFD194769}"/>
+              </a:ext>
+            </a:extLst>
+          </p:cNvPr>
+          <p:cNvCxnSpPr>
+            <a:cxnSpLocks/>
+          </p:cNvCxnSpPr>
+          <p:nvPr/>
+        </p:nvCxnSpPr>
+        <p:spPr>
+          <a:xfrm flipH="1">
+            <a:off x="4112070" y="6137510"/>
+            <a:ext cx="1000131" cy="813"/>
+          </a:xfrm>
+          <a:prstGeom prst="straightConnector1">
+            <a:avLst/>
+          </a:prstGeom>
+          <a:ln w="28575">
+            <a:tailEnd type="triangle"/>
+          </a:ln>
+        </p:spPr>
+        <p:style>
+          <a:lnRef idx="1">
+            <a:schemeClr val="dk1"/>
+          </a:lnRef>
+          <a:fillRef idx="0">
+            <a:schemeClr val="dk1"/>
+          </a:fillRef>
+          <a:effectRef idx="0">
+            <a:schemeClr val="dk1"/>
+          </a:effectRef>
+          <a:fontRef idx="minor">
+            <a:schemeClr val="tx1"/>
+          </a:fontRef>
+        </p:style>
+      </p:cxnSp>
+      <p:cxnSp>
+        <p:nvCxnSpPr>
+          <p:cNvPr id="44" name="Straight Connector 43">
+            <a:extLst>
+              <a:ext uri="{FF2B5EF4-FFF2-40B4-BE49-F238E27FC236}">
+                <a16:creationId xmlns:a16="http://schemas.microsoft.com/office/drawing/2014/main" id="{710A0EBF-8129-C647-BB47-31B0396F1D5C}"/>
+              </a:ext>
+            </a:extLst>
+          </p:cNvPr>
+          <p:cNvCxnSpPr>
+            <a:cxnSpLocks/>
+          </p:cNvCxnSpPr>
+          <p:nvPr/>
+        </p:nvCxnSpPr>
+        <p:spPr>
+          <a:xfrm>
+            <a:off x="5123087" y="4493251"/>
+            <a:ext cx="6796" cy="1787806"/>
+          </a:xfrm>
+          <a:prstGeom prst="line">
+            <a:avLst/>
+          </a:prstGeom>
+          <a:ln w="28575"/>
+        </p:spPr>
+        <p:style>
+          <a:lnRef idx="1">
+            <a:schemeClr val="dk1"/>
+          </a:lnRef>
+          <a:fillRef idx="0">
+            <a:schemeClr val="dk1"/>
+          </a:fillRef>
+          <a:effectRef idx="0">
+            <a:schemeClr val="dk1"/>
+          </a:effectRef>
+          <a:fontRef idx="minor">
+            <a:schemeClr val="tx1"/>
+          </a:fontRef>
+        </p:style>
+      </p:cxnSp>
+      <p:cxnSp>
+        <p:nvCxnSpPr>
+          <p:cNvPr id="53" name="Straight Arrow Connector 52">
+            <a:extLst>
+              <a:ext uri="{FF2B5EF4-FFF2-40B4-BE49-F238E27FC236}">
+                <a16:creationId xmlns:a16="http://schemas.microsoft.com/office/drawing/2014/main" id="{B90C01B8-393B-414F-B072-BD293ECAA0C5}"/>
+              </a:ext>
+            </a:extLst>
+          </p:cNvPr>
+          <p:cNvCxnSpPr>
+            <a:cxnSpLocks/>
+          </p:cNvCxnSpPr>
+          <p:nvPr/>
+        </p:nvCxnSpPr>
+        <p:spPr>
+          <a:xfrm flipH="1">
+            <a:off x="5913671" y="5007286"/>
+            <a:ext cx="691245" cy="0"/>
+          </a:xfrm>
+          <a:prstGeom prst="straightConnector1">
+            <a:avLst/>
+          </a:prstGeom>
+          <a:ln w="28575">
+            <a:tailEnd type="triangle"/>
+          </a:ln>
+        </p:spPr>
+        <p:style>
+          <a:lnRef idx="1">
+            <a:schemeClr val="dk1"/>
+          </a:lnRef>
+          <a:fillRef idx="0">
+            <a:schemeClr val="dk1"/>
+          </a:fillRef>
+          <a:effectRef idx="0">
+            <a:schemeClr val="dk1"/>
+          </a:effectRef>
+          <a:fontRef idx="minor">
+            <a:schemeClr val="tx1"/>
+          </a:fontRef>
+        </p:style>
+      </p:cxnSp>
+      <p:sp>
+        <p:nvSpPr>
+          <p:cNvPr id="54" name="TextBox 53">
+            <a:extLst>
+              <a:ext uri="{FF2B5EF4-FFF2-40B4-BE49-F238E27FC236}">
+                <a16:creationId xmlns:a16="http://schemas.microsoft.com/office/drawing/2014/main" id="{C12D6253-9923-C445-B789-823CC78EE3DB}"/>
+              </a:ext>
+            </a:extLst>
+          </p:cNvPr>
+          <p:cNvSpPr txBox="1"/>
+          <p:nvPr/>
+        </p:nvSpPr>
+        <p:spPr>
+          <a:xfrm>
+            <a:off x="5902780" y="5135525"/>
+            <a:ext cx="1336217" cy="461665"/>
+          </a:xfrm>
+          <a:prstGeom prst="rect">
+            <a:avLst/>
+          </a:prstGeom>
+          <a:noFill/>
+        </p:spPr>
+        <p:txBody>
+          <a:bodyPr wrap="square" rtlCol="0">
+            <a:spAutoFit/>
+          </a:bodyPr>
+          <a:lstStyle/>
+          <a:p>
+            <a:r>
+              <a:rPr lang="en-US" sz="2400" dirty="0">
+                <a:latin typeface="Songti TC" panose="02010600040101010101" pitchFamily="2" charset="-120"/>
+                <a:ea typeface="Songti TC" panose="02010600040101010101" pitchFamily="2" charset="-120"/>
+              </a:rPr>
+              <a:t>11Fe</a:t>
+            </a:r>
+            <a:r>
+              <a:rPr lang="en-US" sz="2400" baseline="30000" dirty="0">
+                <a:latin typeface="Songti TC" panose="02010600040101010101" pitchFamily="2" charset="-120"/>
+                <a:ea typeface="Songti TC" panose="02010600040101010101" pitchFamily="2" charset="-120"/>
+              </a:rPr>
+              <a:t>2+</a:t>
+            </a:r>
+            <a:endParaRPr lang="en-CA" sz="2400" dirty="0">
+              <a:latin typeface="Songti TC" panose="02010600040101010101" pitchFamily="2" charset="-120"/>
+              <a:ea typeface="Songti TC" panose="02010600040101010101" pitchFamily="2" charset="-120"/>
+            </a:endParaRPr>
+          </a:p>
+        </p:txBody>
+      </p:sp>
+      <p:sp>
+        <p:nvSpPr>
+          <p:cNvPr id="55" name="TextBox 54">
+            <a:extLst>
+              <a:ext uri="{FF2B5EF4-FFF2-40B4-BE49-F238E27FC236}">
+                <a16:creationId xmlns:a16="http://schemas.microsoft.com/office/drawing/2014/main" id="{AB931D62-3F33-CD46-B1B8-D5C177294F00}"/>
+              </a:ext>
+            </a:extLst>
+          </p:cNvPr>
+          <p:cNvSpPr txBox="1"/>
+          <p:nvPr/>
+        </p:nvSpPr>
+        <p:spPr>
+          <a:xfrm>
+            <a:off x="5908221" y="4581414"/>
+            <a:ext cx="985162" cy="461665"/>
+          </a:xfrm>
+          <a:prstGeom prst="rect">
+            <a:avLst/>
+          </a:prstGeom>
+          <a:noFill/>
+        </p:spPr>
+        <p:txBody>
+          <a:bodyPr wrap="square" rtlCol="0">
+            <a:spAutoFit/>
+          </a:bodyPr>
+          <a:lstStyle/>
+          <a:p>
+            <a:r>
+              <a:rPr lang="en-US" sz="2400" dirty="0">
+                <a:latin typeface="Songti TC" panose="02010600040101010101" pitchFamily="2" charset="-120"/>
+                <a:ea typeface="Songti TC" panose="02010600040101010101" pitchFamily="2" charset="-120"/>
+              </a:rPr>
+              <a:t>9Fe</a:t>
+            </a:r>
+            <a:r>
+              <a:rPr lang="en-US" sz="2400" baseline="30000" dirty="0">
+                <a:latin typeface="Songti TC" panose="02010600040101010101" pitchFamily="2" charset="-120"/>
+                <a:ea typeface="Songti TC" panose="02010600040101010101" pitchFamily="2" charset="-120"/>
+              </a:rPr>
+              <a:t>3+</a:t>
+            </a:r>
+            <a:endParaRPr lang="en-CA" sz="2400" dirty="0">
+              <a:latin typeface="Songti TC" panose="02010600040101010101" pitchFamily="2" charset="-120"/>
+              <a:ea typeface="Songti TC" panose="02010600040101010101" pitchFamily="2" charset="-120"/>
+            </a:endParaRPr>
+          </a:p>
+        </p:txBody>
+      </p:sp>
+      <p:cxnSp>
+        <p:nvCxnSpPr>
+          <p:cNvPr id="56" name="Straight Arrow Connector 55">
+            <a:extLst>
+              <a:ext uri="{FF2B5EF4-FFF2-40B4-BE49-F238E27FC236}">
+                <a16:creationId xmlns:a16="http://schemas.microsoft.com/office/drawing/2014/main" id="{DF7413B1-D986-C848-AC65-12DD02A2CC76}"/>
+              </a:ext>
+            </a:extLst>
+          </p:cNvPr>
+          <p:cNvCxnSpPr>
+            <a:cxnSpLocks/>
+          </p:cNvCxnSpPr>
+          <p:nvPr/>
+        </p:nvCxnSpPr>
+        <p:spPr>
+          <a:xfrm flipH="1">
+            <a:off x="5920468" y="5006473"/>
+            <a:ext cx="1000131" cy="813"/>
+          </a:xfrm>
+          <a:prstGeom prst="straightConnector1">
+            <a:avLst/>
+          </a:prstGeom>
+          <a:ln w="28575">
+            <a:tailEnd type="triangle"/>
+          </a:ln>
+        </p:spPr>
+        <p:style>
+          <a:lnRef idx="1">
+            <a:schemeClr val="dk1"/>
+          </a:lnRef>
+          <a:fillRef idx="0">
+            <a:schemeClr val="dk1"/>
+          </a:fillRef>
+          <a:effectRef idx="0">
+            <a:schemeClr val="dk1"/>
+          </a:effectRef>
+          <a:fontRef idx="minor">
+            <a:schemeClr val="tx1"/>
+          </a:fontRef>
+        </p:style>
+      </p:cxnSp>
+      <p:sp>
+        <p:nvSpPr>
+          <p:cNvPr id="57" name="TextBox 56">
+            <a:extLst>
+              <a:ext uri="{FF2B5EF4-FFF2-40B4-BE49-F238E27FC236}">
+                <a16:creationId xmlns:a16="http://schemas.microsoft.com/office/drawing/2014/main" id="{866AAE6E-75AF-4241-ACB0-95EDDAFC2220}"/>
+              </a:ext>
+            </a:extLst>
+          </p:cNvPr>
+          <p:cNvSpPr txBox="1"/>
+          <p:nvPr/>
+        </p:nvSpPr>
+        <p:spPr>
+          <a:xfrm>
+            <a:off x="5902780" y="5701149"/>
+            <a:ext cx="985162" cy="461665"/>
+          </a:xfrm>
+          <a:prstGeom prst="rect">
+            <a:avLst/>
+          </a:prstGeom>
+          <a:noFill/>
+        </p:spPr>
+        <p:txBody>
+          <a:bodyPr wrap="square" rtlCol="0">
+            <a:spAutoFit/>
+          </a:bodyPr>
+          <a:lstStyle/>
+          <a:p>
+            <a:r>
+              <a:rPr lang="en-US" sz="2400" dirty="0">
+                <a:latin typeface="Songti TC" panose="02010600040101010101" pitchFamily="2" charset="-120"/>
+                <a:ea typeface="Songti TC" panose="02010600040101010101" pitchFamily="2" charset="-120"/>
+              </a:rPr>
+              <a:t>5ClO</a:t>
+            </a:r>
+            <a:r>
+              <a:rPr lang="en-US" sz="2400" baseline="30000" dirty="0">
+                <a:latin typeface="Songti TC" panose="02010600040101010101" pitchFamily="2" charset="-120"/>
+                <a:ea typeface="Songti TC" panose="02010600040101010101" pitchFamily="2" charset="-120"/>
+              </a:rPr>
+              <a:t>- </a:t>
+            </a:r>
+            <a:endParaRPr lang="en-CA" sz="2400" dirty="0">
+              <a:latin typeface="Songti TC" panose="02010600040101010101" pitchFamily="2" charset="-120"/>
+              <a:ea typeface="Songti TC" panose="02010600040101010101" pitchFamily="2" charset="-120"/>
+            </a:endParaRPr>
+          </a:p>
+        </p:txBody>
+      </p:sp>
+      <p:cxnSp>
+        <p:nvCxnSpPr>
+          <p:cNvPr id="58" name="Straight Arrow Connector 57">
+            <a:extLst>
+              <a:ext uri="{FF2B5EF4-FFF2-40B4-BE49-F238E27FC236}">
+                <a16:creationId xmlns:a16="http://schemas.microsoft.com/office/drawing/2014/main" id="{A24083F3-C1D5-C541-95A4-D47BECE5CA10}"/>
+              </a:ext>
+            </a:extLst>
+          </p:cNvPr>
+          <p:cNvCxnSpPr>
+            <a:cxnSpLocks/>
+          </p:cNvCxnSpPr>
+          <p:nvPr/>
+        </p:nvCxnSpPr>
+        <p:spPr>
+          <a:xfrm>
+            <a:off x="5920468" y="5573960"/>
+            <a:ext cx="1025974" cy="812"/>
+          </a:xfrm>
+          <a:prstGeom prst="straightConnector1">
+            <a:avLst/>
+          </a:prstGeom>
+          <a:ln w="28575">
+            <a:tailEnd type="triangle"/>
+          </a:ln>
+        </p:spPr>
+        <p:style>
+          <a:lnRef idx="1">
+            <a:schemeClr val="dk1"/>
+          </a:lnRef>
+          <a:fillRef idx="0">
+            <a:schemeClr val="dk1"/>
+          </a:fillRef>
+          <a:effectRef idx="0">
+            <a:schemeClr val="dk1"/>
+          </a:effectRef>
+          <a:fontRef idx="minor">
+            <a:schemeClr val="tx1"/>
+          </a:fontRef>
+        </p:style>
+      </p:cxnSp>
+      <p:cxnSp>
+        <p:nvCxnSpPr>
+          <p:cNvPr id="60" name="Straight Connector 59">
+            <a:extLst>
+              <a:ext uri="{FF2B5EF4-FFF2-40B4-BE49-F238E27FC236}">
+                <a16:creationId xmlns:a16="http://schemas.microsoft.com/office/drawing/2014/main" id="{4607824A-34A3-2D47-B682-01A416145E4D}"/>
+              </a:ext>
+            </a:extLst>
+          </p:cNvPr>
+          <p:cNvCxnSpPr>
+            <a:cxnSpLocks/>
+          </p:cNvCxnSpPr>
+          <p:nvPr/>
+        </p:nvCxnSpPr>
+        <p:spPr>
+          <a:xfrm flipH="1">
+            <a:off x="5897347" y="4493251"/>
+            <a:ext cx="9517" cy="1787806"/>
+          </a:xfrm>
+          <a:prstGeom prst="line">
+            <a:avLst/>
+          </a:prstGeom>
+          <a:ln w="28575"/>
+        </p:spPr>
+        <p:style>
+          <a:lnRef idx="1">
+            <a:schemeClr val="dk1"/>
+          </a:lnRef>
+          <a:fillRef idx="0">
+            <a:schemeClr val="dk1"/>
+          </a:fillRef>
+          <a:effectRef idx="0">
+            <a:schemeClr val="dk1"/>
+          </a:effectRef>
+          <a:fontRef idx="minor">
+            <a:schemeClr val="tx1"/>
+          </a:fontRef>
+        </p:style>
+      </p:cxnSp>
+      <p:cxnSp>
+        <p:nvCxnSpPr>
+          <p:cNvPr id="61" name="Straight Arrow Connector 60">
+            <a:extLst>
+              <a:ext uri="{FF2B5EF4-FFF2-40B4-BE49-F238E27FC236}">
+                <a16:creationId xmlns:a16="http://schemas.microsoft.com/office/drawing/2014/main" id="{04DEA0AC-1FCD-1244-893F-D75BC5D3D506}"/>
+              </a:ext>
+            </a:extLst>
+          </p:cNvPr>
+          <p:cNvCxnSpPr>
+            <a:cxnSpLocks/>
+          </p:cNvCxnSpPr>
+          <p:nvPr/>
+        </p:nvCxnSpPr>
+        <p:spPr>
+          <a:xfrm flipH="1">
+            <a:off x="5906864" y="6162370"/>
+            <a:ext cx="1000131" cy="813"/>
+          </a:xfrm>
+          <a:prstGeom prst="straightConnector1">
+            <a:avLst/>
+          </a:prstGeom>
+          <a:ln w="28575">
+            <a:tailEnd type="triangle"/>
+          </a:ln>
+        </p:spPr>
+        <p:style>
+          <a:lnRef idx="1">
+            <a:schemeClr val="dk1"/>
+          </a:lnRef>
+          <a:fillRef idx="0">
+            <a:schemeClr val="dk1"/>
+          </a:fillRef>
+          <a:effectRef idx="0">
+            <a:schemeClr val="dk1"/>
+          </a:effectRef>
+          <a:fontRef idx="minor">
+            <a:schemeClr val="tx1"/>
+          </a:fontRef>
+        </p:style>
+      </p:cxnSp>
+    </p:spTree>
+    <p:extLst>
+      <p:ext uri="{BB962C8B-B14F-4D97-AF65-F5344CB8AC3E}">
+        <p14:creationId xmlns:p14="http://schemas.microsoft.com/office/powerpoint/2010/main" val="1085149705"/>
+      </p:ext>
+    </p:extLst>
+  </p:cSld>
+  <p:clrMapOvr>
+    <a:masterClrMapping/>
+  </p:clrMapOvr>
+</p:sld>
+</file>
+
 <file path=ppt/theme/theme1.xml><?xml version="1.0" encoding="utf-8"?>
 <a:theme xmlns:a="http://schemas.openxmlformats.org/drawingml/2006/main" name="Office Theme">
   <a:themeElements>

</xml_diff>

<commit_message>
Fixed CD -> Current for Plots
</commit_message>
<xml_diff>
--- a/ChemPhysicsMisc/MiscScienceScripts/CuPourbaixannotated.pptx
+++ b/ChemPhysicsMisc/MiscScienceScripts/CuPourbaixannotated.pptx
@@ -8,6 +8,7 @@
     <p:sldId id="256" r:id="rId2"/>
     <p:sldId id="257" r:id="rId3"/>
     <p:sldId id="259" r:id="rId4"/>
+    <p:sldId id="260" r:id="rId5"/>
   </p:sldIdLst>
   <p:sldSz cx="12192000" cy="6858000"/>
   <p:notesSz cx="6858000" cy="9144000"/>
@@ -263,7 +264,7 @@
           <a:p>
             <a:fld id="{22C4EE2D-CA8C-DA4F-A22D-50BF5AF47C96}" type="datetimeFigureOut">
               <a:rPr lang="en-CA" smtClean="0"/>
-              <a:t>2022-02-19</a:t>
+              <a:t>2022-03-01</a:t>
             </a:fld>
             <a:endParaRPr lang="en-CA"/>
           </a:p>
@@ -463,7 +464,7 @@
           <a:p>
             <a:fld id="{22C4EE2D-CA8C-DA4F-A22D-50BF5AF47C96}" type="datetimeFigureOut">
               <a:rPr lang="en-CA" smtClean="0"/>
-              <a:t>2022-02-19</a:t>
+              <a:t>2022-03-01</a:t>
             </a:fld>
             <a:endParaRPr lang="en-CA"/>
           </a:p>
@@ -673,7 +674,7 @@
           <a:p>
             <a:fld id="{22C4EE2D-CA8C-DA4F-A22D-50BF5AF47C96}" type="datetimeFigureOut">
               <a:rPr lang="en-CA" smtClean="0"/>
-              <a:t>2022-02-19</a:t>
+              <a:t>2022-03-01</a:t>
             </a:fld>
             <a:endParaRPr lang="en-CA"/>
           </a:p>
@@ -873,7 +874,7 @@
           <a:p>
             <a:fld id="{22C4EE2D-CA8C-DA4F-A22D-50BF5AF47C96}" type="datetimeFigureOut">
               <a:rPr lang="en-CA" smtClean="0"/>
-              <a:t>2022-02-19</a:t>
+              <a:t>2022-03-01</a:t>
             </a:fld>
             <a:endParaRPr lang="en-CA"/>
           </a:p>
@@ -1149,7 +1150,7 @@
           <a:p>
             <a:fld id="{22C4EE2D-CA8C-DA4F-A22D-50BF5AF47C96}" type="datetimeFigureOut">
               <a:rPr lang="en-CA" smtClean="0"/>
-              <a:t>2022-02-19</a:t>
+              <a:t>2022-03-01</a:t>
             </a:fld>
             <a:endParaRPr lang="en-CA"/>
           </a:p>
@@ -1417,7 +1418,7 @@
           <a:p>
             <a:fld id="{22C4EE2D-CA8C-DA4F-A22D-50BF5AF47C96}" type="datetimeFigureOut">
               <a:rPr lang="en-CA" smtClean="0"/>
-              <a:t>2022-02-19</a:t>
+              <a:t>2022-03-01</a:t>
             </a:fld>
             <a:endParaRPr lang="en-CA"/>
           </a:p>
@@ -1832,7 +1833,7 @@
           <a:p>
             <a:fld id="{22C4EE2D-CA8C-DA4F-A22D-50BF5AF47C96}" type="datetimeFigureOut">
               <a:rPr lang="en-CA" smtClean="0"/>
-              <a:t>2022-02-19</a:t>
+              <a:t>2022-03-01</a:t>
             </a:fld>
             <a:endParaRPr lang="en-CA"/>
           </a:p>
@@ -1974,7 +1975,7 @@
           <a:p>
             <a:fld id="{22C4EE2D-CA8C-DA4F-A22D-50BF5AF47C96}" type="datetimeFigureOut">
               <a:rPr lang="en-CA" smtClean="0"/>
-              <a:t>2022-02-19</a:t>
+              <a:t>2022-03-01</a:t>
             </a:fld>
             <a:endParaRPr lang="en-CA"/>
           </a:p>
@@ -2087,7 +2088,7 @@
           <a:p>
             <a:fld id="{22C4EE2D-CA8C-DA4F-A22D-50BF5AF47C96}" type="datetimeFigureOut">
               <a:rPr lang="en-CA" smtClean="0"/>
-              <a:t>2022-02-19</a:t>
+              <a:t>2022-03-01</a:t>
             </a:fld>
             <a:endParaRPr lang="en-CA"/>
           </a:p>
@@ -2400,7 +2401,7 @@
           <a:p>
             <a:fld id="{22C4EE2D-CA8C-DA4F-A22D-50BF5AF47C96}" type="datetimeFigureOut">
               <a:rPr lang="en-CA" smtClean="0"/>
-              <a:t>2022-02-19</a:t>
+              <a:t>2022-03-01</a:t>
             </a:fld>
             <a:endParaRPr lang="en-CA"/>
           </a:p>
@@ -2689,7 +2690,7 @@
           <a:p>
             <a:fld id="{22C4EE2D-CA8C-DA4F-A22D-50BF5AF47C96}" type="datetimeFigureOut">
               <a:rPr lang="en-CA" smtClean="0"/>
-              <a:t>2022-02-19</a:t>
+              <a:t>2022-03-01</a:t>
             </a:fld>
             <a:endParaRPr lang="en-CA"/>
           </a:p>
@@ -2932,7 +2933,7 @@
           <a:p>
             <a:fld id="{22C4EE2D-CA8C-DA4F-A22D-50BF5AF47C96}" type="datetimeFigureOut">
               <a:rPr lang="en-CA" smtClean="0"/>
-              <a:t>2022-02-19</a:t>
+              <a:t>2022-03-01</a:t>
             </a:fld>
             <a:endParaRPr lang="en-CA"/>
           </a:p>
@@ -6906,6 +6907,126 @@
 </p:sld>
 </file>
 
+<file path=ppt/slides/slide4.xml><?xml version="1.0" encoding="utf-8"?>
+<p:sld xmlns:a="http://schemas.openxmlformats.org/drawingml/2006/main" xmlns:r="http://schemas.openxmlformats.org/officeDocument/2006/relationships" xmlns:p="http://schemas.openxmlformats.org/presentationml/2006/main">
+  <p:cSld>
+    <p:spTree>
+      <p:nvGrpSpPr>
+        <p:cNvPr id="1" name=""/>
+        <p:cNvGrpSpPr/>
+        <p:nvPr/>
+      </p:nvGrpSpPr>
+      <p:grpSpPr>
+        <a:xfrm>
+          <a:off x="0" y="0"/>
+          <a:ext cx="0" cy="0"/>
+          <a:chOff x="0" y="0"/>
+          <a:chExt cx="0" cy="0"/>
+        </a:xfrm>
+      </p:grpSpPr>
+      <p:pic>
+        <p:nvPicPr>
+          <p:cNvPr id="7" name="Picture 6" descr="Graphical user interface, calendar&#10;&#10;Description automatically generated">
+            <a:extLst>
+              <a:ext uri="{FF2B5EF4-FFF2-40B4-BE49-F238E27FC236}">
+                <a16:creationId xmlns:a16="http://schemas.microsoft.com/office/drawing/2014/main" id="{A337AAE8-ADA4-794A-BE7A-9C0DE3E83A31}"/>
+              </a:ext>
+            </a:extLst>
+          </p:cNvPr>
+          <p:cNvPicPr>
+            <a:picLocks noChangeAspect="1"/>
+          </p:cNvPicPr>
+          <p:nvPr/>
+        </p:nvPicPr>
+        <p:blipFill>
+          <a:blip r:embed="rId2"/>
+          <a:stretch>
+            <a:fillRect/>
+          </a:stretch>
+        </p:blipFill>
+        <p:spPr>
+          <a:xfrm>
+            <a:off x="7406613" y="0"/>
+            <a:ext cx="3008049" cy="6858000"/>
+          </a:xfrm>
+          <a:prstGeom prst="rect">
+            <a:avLst/>
+          </a:prstGeom>
+        </p:spPr>
+      </p:pic>
+      <p:pic>
+        <p:nvPicPr>
+          <p:cNvPr id="3" name="Picture 2" descr="Shape, rectangle&#10;&#10;Description automatically generated">
+            <a:extLst>
+              <a:ext uri="{FF2B5EF4-FFF2-40B4-BE49-F238E27FC236}">
+                <a16:creationId xmlns:a16="http://schemas.microsoft.com/office/drawing/2014/main" id="{D410BCC5-8ACC-9542-9EEE-6DA0AE4B0E0B}"/>
+              </a:ext>
+            </a:extLst>
+          </p:cNvPr>
+          <p:cNvPicPr>
+            <a:picLocks noChangeAspect="1"/>
+          </p:cNvPicPr>
+          <p:nvPr/>
+        </p:nvPicPr>
+        <p:blipFill>
+          <a:blip r:embed="rId3"/>
+          <a:stretch>
+            <a:fillRect/>
+          </a:stretch>
+        </p:blipFill>
+        <p:spPr>
+          <a:xfrm>
+            <a:off x="2745325" y="0"/>
+            <a:ext cx="5041362" cy="3600973"/>
+          </a:xfrm>
+          <a:prstGeom prst="rect">
+            <a:avLst/>
+          </a:prstGeom>
+        </p:spPr>
+      </p:pic>
+      <p:pic>
+        <p:nvPicPr>
+          <p:cNvPr id="5" name="Picture 4" descr="Shape&#10;&#10;Description automatically generated">
+            <a:extLst>
+              <a:ext uri="{FF2B5EF4-FFF2-40B4-BE49-F238E27FC236}">
+                <a16:creationId xmlns:a16="http://schemas.microsoft.com/office/drawing/2014/main" id="{20AC8B8D-BD0B-884A-8657-68FA193DDF5A}"/>
+              </a:ext>
+            </a:extLst>
+          </p:cNvPr>
+          <p:cNvPicPr>
+            <a:picLocks noChangeAspect="1"/>
+          </p:cNvPicPr>
+          <p:nvPr/>
+        </p:nvPicPr>
+        <p:blipFill>
+          <a:blip r:embed="rId4"/>
+          <a:stretch>
+            <a:fillRect/>
+          </a:stretch>
+        </p:blipFill>
+        <p:spPr>
+          <a:xfrm>
+            <a:off x="2745325" y="3357043"/>
+            <a:ext cx="5041362" cy="3600973"/>
+          </a:xfrm>
+          <a:prstGeom prst="rect">
+            <a:avLst/>
+          </a:prstGeom>
+        </p:spPr>
+      </p:pic>
+    </p:spTree>
+    <p:extLst>
+      <p:ext uri="{BB962C8B-B14F-4D97-AF65-F5344CB8AC3E}">
+        <p14:creationId xmlns:p14="http://schemas.microsoft.com/office/powerpoint/2010/main" val="1849762495"/>
+      </p:ext>
+    </p:extLst>
+  </p:cSld>
+  <p:clrMapOvr>
+    <a:masterClrMapping/>
+  </p:clrMapOvr>
+</p:sld>
+</file>
+
 <file path=ppt/theme/theme1.xml><?xml version="1.0" encoding="utf-8"?>
 <a:theme xmlns:a="http://schemas.openxmlformats.org/drawingml/2006/main" name="Office Theme">
   <a:themeElements>

</xml_diff>

<commit_message>
Fixed CuOvPo Behaviour, Remade Graphs
</commit_message>
<xml_diff>
--- a/ChemPhysicsMisc/MiscScienceScripts/CuPourbaixannotated.pptx
+++ b/ChemPhysicsMisc/MiscScienceScripts/CuPourbaixannotated.pptx
@@ -264,7 +264,7 @@
           <a:p>
             <a:fld id="{22C4EE2D-CA8C-DA4F-A22D-50BF5AF47C96}" type="datetimeFigureOut">
               <a:rPr lang="en-CA" smtClean="0"/>
-              <a:t>2022-03-01</a:t>
+              <a:t>2022-03-03</a:t>
             </a:fld>
             <a:endParaRPr lang="en-CA"/>
           </a:p>
@@ -464,7 +464,7 @@
           <a:p>
             <a:fld id="{22C4EE2D-CA8C-DA4F-A22D-50BF5AF47C96}" type="datetimeFigureOut">
               <a:rPr lang="en-CA" smtClean="0"/>
-              <a:t>2022-03-01</a:t>
+              <a:t>2022-03-03</a:t>
             </a:fld>
             <a:endParaRPr lang="en-CA"/>
           </a:p>
@@ -674,7 +674,7 @@
           <a:p>
             <a:fld id="{22C4EE2D-CA8C-DA4F-A22D-50BF5AF47C96}" type="datetimeFigureOut">
               <a:rPr lang="en-CA" smtClean="0"/>
-              <a:t>2022-03-01</a:t>
+              <a:t>2022-03-03</a:t>
             </a:fld>
             <a:endParaRPr lang="en-CA"/>
           </a:p>
@@ -874,7 +874,7 @@
           <a:p>
             <a:fld id="{22C4EE2D-CA8C-DA4F-A22D-50BF5AF47C96}" type="datetimeFigureOut">
               <a:rPr lang="en-CA" smtClean="0"/>
-              <a:t>2022-03-01</a:t>
+              <a:t>2022-03-03</a:t>
             </a:fld>
             <a:endParaRPr lang="en-CA"/>
           </a:p>
@@ -1150,7 +1150,7 @@
           <a:p>
             <a:fld id="{22C4EE2D-CA8C-DA4F-A22D-50BF5AF47C96}" type="datetimeFigureOut">
               <a:rPr lang="en-CA" smtClean="0"/>
-              <a:t>2022-03-01</a:t>
+              <a:t>2022-03-03</a:t>
             </a:fld>
             <a:endParaRPr lang="en-CA"/>
           </a:p>
@@ -1418,7 +1418,7 @@
           <a:p>
             <a:fld id="{22C4EE2D-CA8C-DA4F-A22D-50BF5AF47C96}" type="datetimeFigureOut">
               <a:rPr lang="en-CA" smtClean="0"/>
-              <a:t>2022-03-01</a:t>
+              <a:t>2022-03-03</a:t>
             </a:fld>
             <a:endParaRPr lang="en-CA"/>
           </a:p>
@@ -1833,7 +1833,7 @@
           <a:p>
             <a:fld id="{22C4EE2D-CA8C-DA4F-A22D-50BF5AF47C96}" type="datetimeFigureOut">
               <a:rPr lang="en-CA" smtClean="0"/>
-              <a:t>2022-03-01</a:t>
+              <a:t>2022-03-03</a:t>
             </a:fld>
             <a:endParaRPr lang="en-CA"/>
           </a:p>
@@ -1975,7 +1975,7 @@
           <a:p>
             <a:fld id="{22C4EE2D-CA8C-DA4F-A22D-50BF5AF47C96}" type="datetimeFigureOut">
               <a:rPr lang="en-CA" smtClean="0"/>
-              <a:t>2022-03-01</a:t>
+              <a:t>2022-03-03</a:t>
             </a:fld>
             <a:endParaRPr lang="en-CA"/>
           </a:p>
@@ -2088,7 +2088,7 @@
           <a:p>
             <a:fld id="{22C4EE2D-CA8C-DA4F-A22D-50BF5AF47C96}" type="datetimeFigureOut">
               <a:rPr lang="en-CA" smtClean="0"/>
-              <a:t>2022-03-01</a:t>
+              <a:t>2022-03-03</a:t>
             </a:fld>
             <a:endParaRPr lang="en-CA"/>
           </a:p>
@@ -2401,7 +2401,7 @@
           <a:p>
             <a:fld id="{22C4EE2D-CA8C-DA4F-A22D-50BF5AF47C96}" type="datetimeFigureOut">
               <a:rPr lang="en-CA" smtClean="0"/>
-              <a:t>2022-03-01</a:t>
+              <a:t>2022-03-03</a:t>
             </a:fld>
             <a:endParaRPr lang="en-CA"/>
           </a:p>
@@ -2690,7 +2690,7 @@
           <a:p>
             <a:fld id="{22C4EE2D-CA8C-DA4F-A22D-50BF5AF47C96}" type="datetimeFigureOut">
               <a:rPr lang="en-CA" smtClean="0"/>
-              <a:t>2022-03-01</a:t>
+              <a:t>2022-03-03</a:t>
             </a:fld>
             <a:endParaRPr lang="en-CA"/>
           </a:p>
@@ -2933,7 +2933,7 @@
           <a:p>
             <a:fld id="{22C4EE2D-CA8C-DA4F-A22D-50BF5AF47C96}" type="datetimeFigureOut">
               <a:rPr lang="en-CA" smtClean="0"/>
-              <a:t>2022-03-01</a:t>
+              <a:t>2022-03-03</a:t>
             </a:fld>
             <a:endParaRPr lang="en-CA"/>
           </a:p>
@@ -6986,10 +6986,10 @@
       </p:pic>
       <p:pic>
         <p:nvPicPr>
-          <p:cNvPr id="5" name="Picture 4" descr="Shape&#10;&#10;Description automatically generated">
-            <a:extLst>
-              <a:ext uri="{FF2B5EF4-FFF2-40B4-BE49-F238E27FC236}">
-                <a16:creationId xmlns:a16="http://schemas.microsoft.com/office/drawing/2014/main" id="{20AC8B8D-BD0B-884A-8657-68FA193DDF5A}"/>
+          <p:cNvPr id="4" name="Picture 3" descr="Shape&#10;&#10;Description automatically generated">
+            <a:extLst>
+              <a:ext uri="{FF2B5EF4-FFF2-40B4-BE49-F238E27FC236}">
+                <a16:creationId xmlns:a16="http://schemas.microsoft.com/office/drawing/2014/main" id="{19BB49DB-53CE-3349-B2FB-17935C57ADD7}"/>
               </a:ext>
             </a:extLst>
           </p:cNvPr>
@@ -7006,7 +7006,7 @@
         </p:blipFill>
         <p:spPr>
           <a:xfrm>
-            <a:off x="2745325" y="3357043"/>
+            <a:off x="2726738" y="3257027"/>
             <a:ext cx="5041362" cy="3600973"/>
           </a:xfrm>
           <a:prstGeom prst="rect">

</xml_diff>